<commit_message>
fixup graphics. fixing #127, #121 and #119
</commit_message>
<xml_diff>
--- a/images/PMIR_WorkflowGraphic_v2.pptx
+++ b/images/PMIR_WorkflowGraphic_v2.pptx
@@ -198,7 +198,7 @@
           <a:p>
             <a:fld id="{027AA176-FCA2-4464-91C2-6F17FF3F4B95}" type="datetimeFigureOut">
               <a:rPr lang="en-US" smtClean="0"/>
-              <a:t>11/4/2020</a:t>
+              <a:t>2/18/2021</a:t>
             </a:fld>
             <a:endParaRPr lang="en-US"/>
           </a:p>
@@ -594,7 +594,7 @@
           <a:p>
             <a:fld id="{D947D1F4-8046-4555-A7DA-FBFCE954525F}" type="datetimeFigureOut">
               <a:rPr lang="en-US" smtClean="0"/>
-              <a:t>11/4/2020</a:t>
+              <a:t>2/18/2021</a:t>
             </a:fld>
             <a:endParaRPr lang="en-US"/>
           </a:p>
@@ -762,7 +762,7 @@
           <a:p>
             <a:fld id="{D947D1F4-8046-4555-A7DA-FBFCE954525F}" type="datetimeFigureOut">
               <a:rPr lang="en-US" smtClean="0"/>
-              <a:t>11/4/2020</a:t>
+              <a:t>2/18/2021</a:t>
             </a:fld>
             <a:endParaRPr lang="en-US"/>
           </a:p>
@@ -940,7 +940,7 @@
           <a:p>
             <a:fld id="{D947D1F4-8046-4555-A7DA-FBFCE954525F}" type="datetimeFigureOut">
               <a:rPr lang="en-US" smtClean="0"/>
-              <a:t>11/4/2020</a:t>
+              <a:t>2/18/2021</a:t>
             </a:fld>
             <a:endParaRPr lang="en-US"/>
           </a:p>
@@ -1108,7 +1108,7 @@
           <a:p>
             <a:fld id="{D947D1F4-8046-4555-A7DA-FBFCE954525F}" type="datetimeFigureOut">
               <a:rPr lang="en-US" smtClean="0"/>
-              <a:t>11/4/2020</a:t>
+              <a:t>2/18/2021</a:t>
             </a:fld>
             <a:endParaRPr lang="en-US"/>
           </a:p>
@@ -1353,7 +1353,7 @@
           <a:p>
             <a:fld id="{D947D1F4-8046-4555-A7DA-FBFCE954525F}" type="datetimeFigureOut">
               <a:rPr lang="en-US" smtClean="0"/>
-              <a:t>11/4/2020</a:t>
+              <a:t>2/18/2021</a:t>
             </a:fld>
             <a:endParaRPr lang="en-US"/>
           </a:p>
@@ -1582,7 +1582,7 @@
           <a:p>
             <a:fld id="{D947D1F4-8046-4555-A7DA-FBFCE954525F}" type="datetimeFigureOut">
               <a:rPr lang="en-US" smtClean="0"/>
-              <a:t>11/4/2020</a:t>
+              <a:t>2/18/2021</a:t>
             </a:fld>
             <a:endParaRPr lang="en-US"/>
           </a:p>
@@ -1946,7 +1946,7 @@
           <a:p>
             <a:fld id="{D947D1F4-8046-4555-A7DA-FBFCE954525F}" type="datetimeFigureOut">
               <a:rPr lang="en-US" smtClean="0"/>
-              <a:t>11/4/2020</a:t>
+              <a:t>2/18/2021</a:t>
             </a:fld>
             <a:endParaRPr lang="en-US"/>
           </a:p>
@@ -2063,7 +2063,7 @@
           <a:p>
             <a:fld id="{D947D1F4-8046-4555-A7DA-FBFCE954525F}" type="datetimeFigureOut">
               <a:rPr lang="en-US" smtClean="0"/>
-              <a:t>11/4/2020</a:t>
+              <a:t>2/18/2021</a:t>
             </a:fld>
             <a:endParaRPr lang="en-US"/>
           </a:p>
@@ -2158,7 +2158,7 @@
           <a:p>
             <a:fld id="{D947D1F4-8046-4555-A7DA-FBFCE954525F}" type="datetimeFigureOut">
               <a:rPr lang="en-US" smtClean="0"/>
-              <a:t>11/4/2020</a:t>
+              <a:t>2/18/2021</a:t>
             </a:fld>
             <a:endParaRPr lang="en-US"/>
           </a:p>
@@ -2433,7 +2433,7 @@
           <a:p>
             <a:fld id="{D947D1F4-8046-4555-A7DA-FBFCE954525F}" type="datetimeFigureOut">
               <a:rPr lang="en-US" smtClean="0"/>
-              <a:t>11/4/2020</a:t>
+              <a:t>2/18/2021</a:t>
             </a:fld>
             <a:endParaRPr lang="en-US"/>
           </a:p>
@@ -2685,7 +2685,7 @@
           <a:p>
             <a:fld id="{D947D1F4-8046-4555-A7DA-FBFCE954525F}" type="datetimeFigureOut">
               <a:rPr lang="en-US" smtClean="0"/>
-              <a:t>11/4/2020</a:t>
+              <a:t>2/18/2021</a:t>
             </a:fld>
             <a:endParaRPr lang="en-US"/>
           </a:p>
@@ -2896,7 +2896,7 @@
           <a:p>
             <a:fld id="{D947D1F4-8046-4555-A7DA-FBFCE954525F}" type="datetimeFigureOut">
               <a:rPr lang="en-US" smtClean="0"/>
-              <a:t>11/4/2020</a:t>
+              <a:t>2/18/2021</a:t>
             </a:fld>
             <a:endParaRPr lang="en-US"/>
           </a:p>
@@ -3303,21 +3303,21 @@
       </p:grpSpPr>
       <p:sp>
         <p:nvSpPr>
-          <p:cNvPr id="4" name="Rounded Rectangle 3"/>
+          <p:cNvPr id="17" name="Rounded Rectangle 16"/>
           <p:cNvSpPr/>
           <p:nvPr/>
         </p:nvSpPr>
         <p:spPr>
           <a:xfrm>
-            <a:off x="1083449" y="284310"/>
-            <a:ext cx="10043031" cy="6085754"/>
+            <a:off x="5250321" y="1104225"/>
+            <a:ext cx="2073762" cy="1918827"/>
           </a:xfrm>
           <a:prstGeom prst="roundRect">
             <a:avLst/>
           </a:prstGeom>
           <a:solidFill>
             <a:schemeClr val="accent1">
-              <a:alpha val="50000"/>
+              <a:lumMod val="75000"/>
             </a:schemeClr>
           </a:solidFill>
           <a:ln>
@@ -3349,22 +3349,22 @@
       </p:sp>
       <p:sp>
         <p:nvSpPr>
-          <p:cNvPr id="17" name="Rounded Rectangle 16"/>
+          <p:cNvPr id="12" name="Rounded Rectangle 11"/>
           <p:cNvSpPr/>
           <p:nvPr/>
         </p:nvSpPr>
         <p:spPr>
           <a:xfrm>
-            <a:off x="5322364" y="1560435"/>
-            <a:ext cx="1634388" cy="1522071"/>
+            <a:off x="633216" y="227770"/>
+            <a:ext cx="3316316" cy="6240987"/>
           </a:xfrm>
           <a:prstGeom prst="roundRect">
             <a:avLst/>
           </a:prstGeom>
           <a:solidFill>
-            <a:srgbClr val="7030A0">
-              <a:alpha val="20000"/>
-            </a:srgbClr>
+            <a:schemeClr val="accent1">
+              <a:lumMod val="75000"/>
+            </a:schemeClr>
           </a:solidFill>
           <a:ln>
             <a:noFill/>
@@ -3395,60 +3395,14 @@
       </p:sp>
       <p:sp>
         <p:nvSpPr>
-          <p:cNvPr id="12" name="Rounded Rectangle 11"/>
-          <p:cNvSpPr/>
-          <p:nvPr/>
-        </p:nvSpPr>
-        <p:spPr>
-          <a:xfrm>
-            <a:off x="1683499" y="865205"/>
-            <a:ext cx="2613678" cy="4950537"/>
-          </a:xfrm>
-          <a:prstGeom prst="roundRect">
-            <a:avLst/>
-          </a:prstGeom>
-          <a:solidFill>
-            <a:srgbClr val="7030A0">
-              <a:alpha val="20000"/>
-            </a:srgbClr>
-          </a:solidFill>
-          <a:ln>
-            <a:noFill/>
-          </a:ln>
-        </p:spPr>
-        <p:style>
-          <a:lnRef idx="0">
-            <a:scrgbClr r="0" g="0" b="0"/>
-          </a:lnRef>
-          <a:fillRef idx="0">
-            <a:scrgbClr r="0" g="0" b="0"/>
-          </a:fillRef>
-          <a:effectRef idx="0">
-            <a:scrgbClr r="0" g="0" b="0"/>
-          </a:effectRef>
-          <a:fontRef idx="minor">
-            <a:schemeClr val="lt1"/>
-          </a:fontRef>
-        </p:style>
-        <p:txBody>
-          <a:bodyPr rtlCol="0" anchor="ctr"/>
-          <a:lstStyle/>
-          <a:p>
-            <a:pPr algn="ctr"/>
-            <a:endParaRPr lang="en-US"/>
-          </a:p>
-        </p:txBody>
-      </p:sp>
-      <p:sp>
-        <p:nvSpPr>
           <p:cNvPr id="5" name="TextBox 4"/>
           <p:cNvSpPr txBox="1"/>
           <p:nvPr/>
         </p:nvSpPr>
         <p:spPr>
           <a:xfrm>
-            <a:off x="5221600" y="2400505"/>
-            <a:ext cx="1835916" cy="646331"/>
+            <a:off x="5122468" y="2163275"/>
+            <a:ext cx="2329467" cy="814809"/>
           </a:xfrm>
           <a:prstGeom prst="rect">
             <a:avLst/>
@@ -3504,48 +3458,14 @@
         </p:blipFill>
         <p:spPr>
           <a:xfrm>
-            <a:off x="5708027" y="1668004"/>
-            <a:ext cx="832327" cy="696831"/>
+            <a:off x="5739662" y="1239834"/>
+            <a:ext cx="1056082" cy="878473"/>
           </a:xfrm>
           <a:prstGeom prst="rect">
             <a:avLst/>
           </a:prstGeom>
         </p:spPr>
       </p:pic>
-      <p:sp>
-        <p:nvSpPr>
-          <p:cNvPr id="7" name="TextBox 6"/>
-          <p:cNvSpPr txBox="1"/>
-          <p:nvPr/>
-        </p:nvSpPr>
-        <p:spPr>
-          <a:xfrm>
-            <a:off x="3037724" y="339702"/>
-            <a:ext cx="6134480" cy="523220"/>
-          </a:xfrm>
-          <a:prstGeom prst="rect">
-            <a:avLst/>
-          </a:prstGeom>
-          <a:noFill/>
-        </p:spPr>
-        <p:txBody>
-          <a:bodyPr wrap="square" rtlCol="0">
-            <a:spAutoFit/>
-          </a:bodyPr>
-          <a:lstStyle/>
-          <a:p>
-            <a:pPr algn="ctr"/>
-            <a:r>
-              <a:rPr lang="en-US" sz="2800" b="1" dirty="0">
-                <a:solidFill>
-                  <a:schemeClr val="bg1"/>
-                </a:solidFill>
-              </a:rPr>
-              <a:t>Patient Master Identity Registry</a:t>
-            </a:r>
-          </a:p>
-        </p:txBody>
-      </p:sp>
       <p:pic>
         <p:nvPicPr>
           <p:cNvPr id="8" name="Graphic 81">
@@ -3577,8 +3497,8 @@
         </p:blipFill>
         <p:spPr>
           <a:xfrm>
-            <a:off x="2147896" y="2073274"/>
-            <a:ext cx="725780" cy="573872"/>
+            <a:off x="1222457" y="1750745"/>
+            <a:ext cx="920892" cy="723462"/>
           </a:xfrm>
           <a:prstGeom prst="rect">
             <a:avLst/>
@@ -3616,8 +3536,8 @@
         </p:blipFill>
         <p:spPr>
           <a:xfrm>
-            <a:off x="2147896" y="3106767"/>
-            <a:ext cx="686269" cy="686269"/>
+            <a:off x="1222457" y="3053637"/>
+            <a:ext cx="870759" cy="865158"/>
           </a:xfrm>
           <a:prstGeom prst="rect">
             <a:avLst/>
@@ -3655,8 +3575,8 @@
         </p:blipFill>
         <p:spPr>
           <a:xfrm>
-            <a:off x="2147896" y="4151273"/>
-            <a:ext cx="639422" cy="916505"/>
+            <a:off x="1222457" y="4370413"/>
+            <a:ext cx="811318" cy="1155409"/>
           </a:xfrm>
           <a:prstGeom prst="rect">
             <a:avLst/>
@@ -3671,8 +3591,8 @@
         </p:nvSpPr>
         <p:spPr>
           <a:xfrm>
-            <a:off x="1633382" y="1117882"/>
-            <a:ext cx="2593749" cy="923330"/>
+            <a:off x="569626" y="546312"/>
+            <a:ext cx="3291029" cy="1164013"/>
           </a:xfrm>
           <a:prstGeom prst="rect">
             <a:avLst/>
@@ -3724,16 +3644,16 @@
         </p:nvSpPr>
         <p:spPr>
           <a:xfrm>
-            <a:off x="7951204" y="918314"/>
-            <a:ext cx="2613678" cy="4950537"/>
+            <a:off x="8585874" y="294723"/>
+            <a:ext cx="3316316" cy="6240987"/>
           </a:xfrm>
           <a:prstGeom prst="roundRect">
             <a:avLst/>
           </a:prstGeom>
           <a:solidFill>
-            <a:srgbClr val="7030A0">
-              <a:alpha val="20000"/>
-            </a:srgbClr>
+            <a:schemeClr val="accent1">
+              <a:lumMod val="75000"/>
+            </a:schemeClr>
           </a:solidFill>
           <a:ln>
             <a:noFill/>
@@ -3793,8 +3713,8 @@
         </p:blipFill>
         <p:spPr>
           <a:xfrm>
-            <a:off x="9596268" y="3114798"/>
-            <a:ext cx="568307" cy="763664"/>
+            <a:off x="10673183" y="3063762"/>
+            <a:ext cx="721086" cy="962727"/>
           </a:xfrm>
           <a:prstGeom prst="rect">
             <a:avLst/>
@@ -3832,8 +3752,8 @@
         </p:blipFill>
         <p:spPr>
           <a:xfrm>
-            <a:off x="9642013" y="1979439"/>
-            <a:ext cx="476818" cy="715228"/>
+            <a:off x="10731225" y="1632450"/>
+            <a:ext cx="605001" cy="901666"/>
           </a:xfrm>
           <a:prstGeom prst="rect">
             <a:avLst/>
@@ -3848,8 +3768,8 @@
         </p:nvSpPr>
         <p:spPr>
           <a:xfrm>
-            <a:off x="8340085" y="1076967"/>
-            <a:ext cx="1835916" cy="369332"/>
+            <a:off x="9079299" y="494732"/>
+            <a:ext cx="2329467" cy="465605"/>
           </a:xfrm>
           <a:prstGeom prst="rect">
             <a:avLst/>
@@ -3895,16 +3815,16 @@
         </p:nvSpPr>
         <p:spPr>
           <a:xfrm>
-            <a:off x="4624797" y="3684442"/>
-            <a:ext cx="3181205" cy="2131300"/>
+            <a:off x="4365226" y="3781894"/>
+            <a:ext cx="4036411" cy="2686863"/>
           </a:xfrm>
           <a:prstGeom prst="roundRect">
             <a:avLst/>
           </a:prstGeom>
           <a:solidFill>
-            <a:srgbClr val="7030A0">
-              <a:alpha val="20000"/>
-            </a:srgbClr>
+            <a:schemeClr val="accent1">
+              <a:lumMod val="75000"/>
+            </a:schemeClr>
           </a:solidFill>
           <a:ln>
             <a:noFill/>
@@ -3941,8 +3861,8 @@
         </p:nvSpPr>
         <p:spPr>
           <a:xfrm>
-            <a:off x="5110467" y="5044054"/>
-            <a:ext cx="2601361" cy="369332"/>
+            <a:off x="4981459" y="5495914"/>
+            <a:ext cx="3300687" cy="465605"/>
           </a:xfrm>
           <a:prstGeom prst="rect">
             <a:avLst/>
@@ -4003,8 +3923,8 @@
         </p:blipFill>
         <p:spPr>
           <a:xfrm>
-            <a:off x="5825424" y="4331919"/>
-            <a:ext cx="628267" cy="555212"/>
+            <a:off x="5888619" y="4598148"/>
+            <a:ext cx="797165" cy="699938"/>
           </a:xfrm>
           <a:prstGeom prst="rect">
             <a:avLst/>
@@ -4019,8 +3939,8 @@
         </p:nvSpPr>
         <p:spPr>
           <a:xfrm>
-            <a:off x="7988835" y="1963666"/>
-            <a:ext cx="1534637" cy="3477875"/>
+            <a:off x="8633622" y="1612566"/>
+            <a:ext cx="1947195" cy="4384448"/>
           </a:xfrm>
           <a:prstGeom prst="rect">
             <a:avLst/>
@@ -4171,8 +4091,8 @@
         </p:blipFill>
         <p:spPr>
           <a:xfrm>
-            <a:off x="9585591" y="4293469"/>
-            <a:ext cx="590409" cy="576679"/>
+            <a:off x="10659635" y="4549675"/>
+            <a:ext cx="749129" cy="727001"/>
           </a:xfrm>
           <a:prstGeom prst="rect">
             <a:avLst/>
@@ -4187,8 +4107,8 @@
         </p:nvCxnSpPr>
         <p:spPr>
           <a:xfrm flipV="1">
-            <a:off x="3913763" y="2622107"/>
-            <a:ext cx="1421846" cy="1114160"/>
+            <a:off x="3463044" y="2442642"/>
+            <a:ext cx="1804082" cy="1404587"/>
           </a:xfrm>
           <a:prstGeom prst="straightConnector1">
             <a:avLst/>
@@ -4223,8 +4143,8 @@
         </p:nvCxnSpPr>
         <p:spPr>
           <a:xfrm flipV="1">
-            <a:off x="6104964" y="3090057"/>
-            <a:ext cx="34595" cy="1084939"/>
+            <a:off x="6243308" y="3032571"/>
+            <a:ext cx="43895" cy="1367749"/>
           </a:xfrm>
           <a:prstGeom prst="straightConnector1">
             <a:avLst/>
@@ -4260,8 +4180,8 @@
         </p:nvCxnSpPr>
         <p:spPr>
           <a:xfrm flipH="1">
-            <a:off x="6956752" y="1896904"/>
-            <a:ext cx="1383333" cy="424567"/>
+            <a:off x="7324083" y="1528401"/>
+            <a:ext cx="1755216" cy="535238"/>
           </a:xfrm>
           <a:prstGeom prst="straightConnector1">
             <a:avLst/>
@@ -4303,8 +4223,8 @@
         </p:nvSpPr>
         <p:spPr>
           <a:xfrm>
-            <a:off x="7276892" y="1646121"/>
-            <a:ext cx="503482" cy="467931"/>
+            <a:off x="7730286" y="1212247"/>
+            <a:ext cx="638834" cy="589906"/>
           </a:xfrm>
           <a:prstGeom prst="ellipse">
             <a:avLst/>
@@ -4362,8 +4282,8 @@
         </p:nvSpPr>
         <p:spPr>
           <a:xfrm>
-            <a:off x="6168617" y="3239429"/>
-            <a:ext cx="503482" cy="467931"/>
+            <a:off x="6324073" y="3220880"/>
+            <a:ext cx="638834" cy="589906"/>
           </a:xfrm>
           <a:prstGeom prst="ellipse">
             <a:avLst/>
@@ -4421,8 +4341,8 @@
         </p:nvSpPr>
         <p:spPr>
           <a:xfrm>
-            <a:off x="4746281" y="2994004"/>
-            <a:ext cx="503482" cy="467931"/>
+            <a:off x="4519369" y="2911480"/>
+            <a:ext cx="638834" cy="589906"/>
           </a:xfrm>
           <a:prstGeom prst="ellipse">
             <a:avLst/>

</xml_diff>